<commit_message>
Update Melodia presentation for 12.11.2025
Improved the last slide. Now it's adjusted to our presentation.
</commit_message>
<xml_diff>
--- a/Projektunterlagen/999_Zwischenpräsentationen/999_Zwischenpräsentation/999_Zwischenpräsentation/1. Zwischenpräsentation/Zwischenpräsentation Melodia am 12.11.2025.pptx
+++ b/Projektunterlagen/999_Zwischenpräsentationen/999_Zwischenpräsentation/999_Zwischenpräsentation/1. Zwischenpräsentation/Zwischenpräsentation Melodia am 12.11.2025.pptx
@@ -12972,7 +12972,7 @@
       </p:sp>
       <p:pic>
         <p:nvPicPr>
-          <p:cNvPr id="5" name="Bildplatzhalter 14" descr="Berge kurz vor der Abenddämmerung">
+          <p:cNvPr id="5" name="Bildplatzhalter 14">
             <a:extLst>
               <a:ext uri="{FF2B5EF4-FFF2-40B4-BE49-F238E27FC236}">
                 <a16:creationId xmlns:a16="http://schemas.microsoft.com/office/drawing/2014/main" id="{DE72DC91-8DC9-B68C-C1D3-8F5273481A74}"/>
@@ -12986,9 +12986,9 @@
             <p:ph type="pic" sz="quarter" idx="14"/>
           </p:nvPr>
         </p:nvPicPr>
-        <p:blipFill rotWithShape="1">
+        <p:blipFill>
           <a:blip r:embed="rId3"/>
-          <a:srcRect l="13191" r="13191"/>
+          <a:srcRect l="13077" r="13077"/>
           <a:stretch/>
         </p:blipFill>
         <p:spPr>
@@ -12998,73 +12998,6 @@
           </a:xfrm>
         </p:spPr>
       </p:pic>
-      <p:sp>
-        <p:nvSpPr>
-          <p:cNvPr id="3" name="Textplatzhalter 2">
-            <a:extLst>
-              <a:ext uri="{FF2B5EF4-FFF2-40B4-BE49-F238E27FC236}">
-                <a16:creationId xmlns:a16="http://schemas.microsoft.com/office/drawing/2014/main" id="{FD70D88C-5989-4007-4953-F54A4A34B778}"/>
-              </a:ext>
-            </a:extLst>
-          </p:cNvPr>
-          <p:cNvSpPr>
-            <a:spLocks noGrp="1"/>
-          </p:cNvSpPr>
-          <p:nvPr>
-            <p:ph type="body" sz="quarter" idx="13"/>
-          </p:nvPr>
-        </p:nvSpPr>
-        <p:spPr>
-          <a:xfrm>
-            <a:off x="5640609" y="3127248"/>
-            <a:ext cx="6117381" cy="3017520"/>
-          </a:xfrm>
-        </p:spPr>
-        <p:txBody>
-          <a:bodyPr rtlCol="0"/>
-          <a:lstStyle>
-            <a:defPPr>
-              <a:defRPr lang="de-DE"/>
-            </a:defPPr>
-          </a:lstStyle>
-          <a:p>
-            <a:pPr rtl="0"/>
-            <a:r>
-              <a:rPr lang="de-DE" dirty="0"/>
-              <a:t>Brita Tamm</a:t>
-            </a:r>
-          </a:p>
-          <a:p>
-            <a:pPr rtl="0"/>
-            <a:r>
-              <a:rPr lang="de-DE" dirty="0"/>
-              <a:t>502-555-0152</a:t>
-            </a:r>
-          </a:p>
-          <a:p>
-            <a:pPr rtl="0"/>
-            <a:r>
-              <a:rPr lang="de-DE" dirty="0"/>
-              <a:t>brita@firstupconsultants.com</a:t>
-            </a:r>
-          </a:p>
-          <a:p>
-            <a:pPr rtl="0"/>
-            <a:r>
-              <a:rPr lang="de-DE" dirty="0"/>
-              <a:t>www.firstupconsultants.com</a:t>
-            </a:r>
-          </a:p>
-          <a:p>
-            <a:pPr rtl="0"/>
-            <a:endParaRPr lang="de-DE" dirty="0"/>
-          </a:p>
-          <a:p>
-            <a:pPr rtl="0"/>
-            <a:endParaRPr lang="de-DE" dirty="0"/>
-          </a:p>
-        </p:txBody>
-      </p:sp>
     </p:spTree>
     <p:extLst>
       <p:ext uri="{BB962C8B-B14F-4D97-AF65-F5344CB8AC3E}">
@@ -15020,6 +14953,35 @@
 </file>
 
 <file path=customXml/item1.xml><?xml version="1.0" encoding="utf-8"?>
+<?mso-contentType ?>
+<FormTemplates xmlns="http://schemas.microsoft.com/sharepoint/v3/contenttype/forms">
+  <Display>DocumentLibraryForm</Display>
+  <Edit>DocumentLibraryForm</Edit>
+  <New>DocumentLibraryForm</New>
+</FormTemplates>
+</file>
+
+<file path=customXml/item2.xml><?xml version="1.0" encoding="utf-8"?>
+<p:properties xmlns:p="http://schemas.microsoft.com/office/2006/metadata/properties" xmlns:xsi="http://www.w3.org/2001/XMLSchema-instance" xmlns:pc="http://schemas.microsoft.com/office/infopath/2007/PartnerControls">
+  <documentManagement>
+    <_ip_UnifiedCompliancePolicyUIAction xmlns="http://schemas.microsoft.com/sharepoint/v3" xsi:nil="true"/>
+    <Image xmlns="71af3243-3dd4-4a8d-8c0d-dd76da1f02a5">
+      <Url xsi:nil="true"/>
+      <Description xsi:nil="true"/>
+    </Image>
+    <Status xmlns="71af3243-3dd4-4a8d-8c0d-dd76da1f02a5">Not started</Status>
+    <Background xmlns="71af3243-3dd4-4a8d-8c0d-dd76da1f02a5">false</Background>
+    <_ip_UnifiedCompliancePolicyProperties xmlns="http://schemas.microsoft.com/sharepoint/v3" xsi:nil="true"/>
+    <ImageTagsTaxHTField xmlns="71af3243-3dd4-4a8d-8c0d-dd76da1f02a5">
+      <Terms xmlns="http://schemas.microsoft.com/office/infopath/2007/PartnerControls"/>
+    </ImageTagsTaxHTField>
+    <TaxCatchAll xmlns="230e9df3-be65-4c73-a93b-d1236ebd677e" xsi:nil="true"/>
+    <MediaServiceKeyPoints xmlns="71af3243-3dd4-4a8d-8c0d-dd76da1f02a5" xsi:nil="true"/>
+  </documentManagement>
+</p:properties>
+</file>
+
+<file path=customXml/item3.xml><?xml version="1.0" encoding="utf-8"?>
 <ct:contentTypeSchema xmlns:ct="http://schemas.microsoft.com/office/2006/metadata/contentType" xmlns:ma="http://schemas.microsoft.com/office/2006/metadata/properties/metaAttributes" ct:_="" ma:_="" ma:contentTypeName="Document" ma:contentTypeID="0x01010079F111ED35F8CC479449609E8A0923A6" ma:contentTypeVersion="28" ma:contentTypeDescription="Create a new document." ma:contentTypeScope="" ma:versionID="60f5a4f2d2b0abadcf532d48ebf9cb71">
   <xsd:schema xmlns:xsd="http://www.w3.org/2001/XMLSchema" xmlns:xs="http://www.w3.org/2001/XMLSchema" xmlns:p="http://schemas.microsoft.com/office/2006/metadata/properties" xmlns:ns1="http://schemas.microsoft.com/sharepoint/v3" xmlns:ns2="71af3243-3dd4-4a8d-8c0d-dd76da1f02a5" xmlns:ns3="16c05727-aa75-4e4a-9b5f-8a80a1165891" xmlns:ns4="230e9df3-be65-4c73-a93b-d1236ebd677e" targetNamespace="http://schemas.microsoft.com/office/2006/metadata/properties" ma:root="true" ma:fieldsID="7dd78129e6a1811f84807ad11c651531" ns1:_="" ns2:_="" ns3:_="" ns4:_="">
     <xsd:import namespace="http://schemas.microsoft.com/sharepoint/v3"/>
@@ -15331,36 +15293,27 @@
 </ct:contentTypeSchema>
 </file>
 
-<file path=customXml/item2.xml><?xml version="1.0" encoding="utf-8"?>
-<p:properties xmlns:p="http://schemas.microsoft.com/office/2006/metadata/properties" xmlns:xsi="http://www.w3.org/2001/XMLSchema-instance" xmlns:pc="http://schemas.microsoft.com/office/infopath/2007/PartnerControls">
-  <documentManagement>
-    <_ip_UnifiedCompliancePolicyUIAction xmlns="http://schemas.microsoft.com/sharepoint/v3" xsi:nil="true"/>
-    <Image xmlns="71af3243-3dd4-4a8d-8c0d-dd76da1f02a5">
-      <Url xsi:nil="true"/>
-      <Description xsi:nil="true"/>
-    </Image>
-    <Status xmlns="71af3243-3dd4-4a8d-8c0d-dd76da1f02a5">Not started</Status>
-    <Background xmlns="71af3243-3dd4-4a8d-8c0d-dd76da1f02a5">false</Background>
-    <_ip_UnifiedCompliancePolicyProperties xmlns="http://schemas.microsoft.com/sharepoint/v3" xsi:nil="true"/>
-    <ImageTagsTaxHTField xmlns="71af3243-3dd4-4a8d-8c0d-dd76da1f02a5">
-      <Terms xmlns="http://schemas.microsoft.com/office/infopath/2007/PartnerControls"/>
-    </ImageTagsTaxHTField>
-    <TaxCatchAll xmlns="230e9df3-be65-4c73-a93b-d1236ebd677e" xsi:nil="true"/>
-    <MediaServiceKeyPoints xmlns="71af3243-3dd4-4a8d-8c0d-dd76da1f02a5" xsi:nil="true"/>
-  </documentManagement>
-</p:properties>
+<file path=customXml/itemProps1.xml><?xml version="1.0" encoding="utf-8"?>
+<ds:datastoreItem xmlns:ds="http://schemas.openxmlformats.org/officeDocument/2006/customXml" ds:itemID="{FABD9919-8F5A-4B99-83E1-E90FE1DCF2E1}">
+  <ds:schemaRefs>
+    <ds:schemaRef ds:uri="http://schemas.microsoft.com/sharepoint/v3/contenttype/forms"/>
+  </ds:schemaRefs>
+</ds:datastoreItem>
 </file>
 
-<file path=customXml/item3.xml><?xml version="1.0" encoding="utf-8"?>
-<?mso-contentType ?>
-<FormTemplates xmlns="http://schemas.microsoft.com/sharepoint/v3/contenttype/forms">
-  <Display>DocumentLibraryForm</Display>
-  <Edit>DocumentLibraryForm</Edit>
-  <New>DocumentLibraryForm</New>
-</FormTemplates>
+<file path=customXml/itemProps2.xml><?xml version="1.0" encoding="utf-8"?>
+<ds:datastoreItem xmlns:ds="http://schemas.openxmlformats.org/officeDocument/2006/customXml" ds:itemID="{80E87F72-70BF-43BC-A0D4-53665DC12672}">
+  <ds:schemaRefs>
+    <ds:schemaRef ds:uri="http://schemas.microsoft.com/office/2006/metadata/properties"/>
+    <ds:schemaRef ds:uri="http://schemas.microsoft.com/office/infopath/2007/PartnerControls"/>
+    <ds:schemaRef ds:uri="http://schemas.microsoft.com/sharepoint/v3"/>
+    <ds:schemaRef ds:uri="71af3243-3dd4-4a8d-8c0d-dd76da1f02a5"/>
+    <ds:schemaRef ds:uri="230e9df3-be65-4c73-a93b-d1236ebd677e"/>
+  </ds:schemaRefs>
+</ds:datastoreItem>
 </file>
 
-<file path=customXml/itemProps1.xml><?xml version="1.0" encoding="utf-8"?>
+<file path=customXml/itemProps3.xml><?xml version="1.0" encoding="utf-8"?>
 <ds:datastoreItem xmlns:ds="http://schemas.openxmlformats.org/officeDocument/2006/customXml" ds:itemID="{52D646E0-DCC8-4209-B539-AA58186B682C}">
   <ds:schemaRefs>
     <ds:schemaRef ds:uri="http://schemas.microsoft.com/office/2006/metadata/contentType"/>
@@ -15381,26 +15334,6 @@
 </ds:datastoreItem>
 </file>
 
-<file path=customXml/itemProps2.xml><?xml version="1.0" encoding="utf-8"?>
-<ds:datastoreItem xmlns:ds="http://schemas.openxmlformats.org/officeDocument/2006/customXml" ds:itemID="{80E87F72-70BF-43BC-A0D4-53665DC12672}">
-  <ds:schemaRefs>
-    <ds:schemaRef ds:uri="http://schemas.microsoft.com/office/2006/metadata/properties"/>
-    <ds:schemaRef ds:uri="http://schemas.microsoft.com/office/infopath/2007/PartnerControls"/>
-    <ds:schemaRef ds:uri="http://schemas.microsoft.com/sharepoint/v3"/>
-    <ds:schemaRef ds:uri="71af3243-3dd4-4a8d-8c0d-dd76da1f02a5"/>
-    <ds:schemaRef ds:uri="230e9df3-be65-4c73-a93b-d1236ebd677e"/>
-  </ds:schemaRefs>
-</ds:datastoreItem>
-</file>
-
-<file path=customXml/itemProps3.xml><?xml version="1.0" encoding="utf-8"?>
-<ds:datastoreItem xmlns:ds="http://schemas.openxmlformats.org/officeDocument/2006/customXml" ds:itemID="{FABD9919-8F5A-4B99-83E1-E90FE1DCF2E1}">
-  <ds:schemaRefs>
-    <ds:schemaRef ds:uri="http://schemas.microsoft.com/sharepoint/v3/contenttype/forms"/>
-  </ds:schemaRefs>
-</ds:datastoreItem>
-</file>
-
 <file path=docMetadata/LabelInfo.xml><?xml version="1.0" encoding="utf-8"?>
 <clbl:labelList xmlns:clbl="http://schemas.microsoft.com/office/2020/mipLabelMetadata"/>
 </file>
</xml_diff>